<commit_message>
Adde something to PPT
</commit_message>
<xml_diff>
--- a/ppt/Google Testing Framework.pptx
+++ b/ppt/Google Testing Framework.pptx
@@ -12,9 +12,11 @@
     <p:sldId id="259" r:id="rId6"/>
     <p:sldId id="260" r:id="rId7"/>
     <p:sldId id="262" r:id="rId8"/>
-    <p:sldId id="263" r:id="rId9"/>
-    <p:sldId id="264" r:id="rId10"/>
-    <p:sldId id="265" r:id="rId11"/>
+    <p:sldId id="267" r:id="rId9"/>
+    <p:sldId id="266" r:id="rId10"/>
+    <p:sldId id="263" r:id="rId11"/>
+    <p:sldId id="264" r:id="rId12"/>
+    <p:sldId id="265" r:id="rId13"/>
   </p:sldIdLst>
   <p:sldSz cx="9144000" cy="6858000" type="screen4x3"/>
   <p:notesSz cx="6858000" cy="9144000"/>
@@ -2873,7 +2875,7 @@
           <a:p>
             <a:fld id="{792B2D57-2864-4E3D-B44A-69283E94E5CC}" type="datetimeFigureOut">
               <a:rPr lang="en-US" smtClean="0"/>
-              <a:t>11/16/2016</a:t>
+              <a:t>11/23/2016</a:t>
             </a:fld>
             <a:endParaRPr lang="en-US"/>
           </a:p>
@@ -3158,7 +3160,7 @@
           <a:p>
             <a:fld id="{792B2D57-2864-4E3D-B44A-69283E94E5CC}" type="datetimeFigureOut">
               <a:rPr lang="en-US" smtClean="0"/>
-              <a:t>11/16/2016</a:t>
+              <a:t>11/23/2016</a:t>
             </a:fld>
             <a:endParaRPr lang="en-US"/>
           </a:p>
@@ -3333,7 +3335,7 @@
           <a:p>
             <a:fld id="{792B2D57-2864-4E3D-B44A-69283E94E5CC}" type="datetimeFigureOut">
               <a:rPr lang="en-US" smtClean="0"/>
-              <a:t>11/16/2016</a:t>
+              <a:t>11/23/2016</a:t>
             </a:fld>
             <a:endParaRPr lang="en-US"/>
           </a:p>
@@ -3498,7 +3500,7 @@
           <a:p>
             <a:fld id="{792B2D57-2864-4E3D-B44A-69283E94E5CC}" type="datetimeFigureOut">
               <a:rPr lang="en-US" smtClean="0"/>
-              <a:t>11/16/2016</a:t>
+              <a:t>11/23/2016</a:t>
             </a:fld>
             <a:endParaRPr lang="en-US"/>
           </a:p>
@@ -3739,7 +3741,7 @@
           <a:p>
             <a:fld id="{792B2D57-2864-4E3D-B44A-69283E94E5CC}" type="datetimeFigureOut">
               <a:rPr lang="en-US" smtClean="0"/>
-              <a:t>11/16/2016</a:t>
+              <a:t>11/23/2016</a:t>
             </a:fld>
             <a:endParaRPr lang="en-US"/>
           </a:p>
@@ -3852,7 +3854,7 @@
           <a:p>
             <a:fld id="{792B2D57-2864-4E3D-B44A-69283E94E5CC}" type="datetimeFigureOut">
               <a:rPr lang="en-US" smtClean="0"/>
-              <a:t>11/16/2016</a:t>
+              <a:t>11/23/2016</a:t>
             </a:fld>
             <a:endParaRPr lang="en-US"/>
           </a:p>
@@ -4391,7 +4393,7 @@
           <a:p>
             <a:fld id="{792B2D57-2864-4E3D-B44A-69283E94E5CC}" type="datetimeFigureOut">
               <a:rPr lang="en-US" smtClean="0"/>
-              <a:t>11/16/2016</a:t>
+              <a:t>11/23/2016</a:t>
             </a:fld>
             <a:endParaRPr lang="en-US"/>
           </a:p>
@@ -4504,7 +4506,7 @@
           <a:p>
             <a:fld id="{792B2D57-2864-4E3D-B44A-69283E94E5CC}" type="datetimeFigureOut">
               <a:rPr lang="en-US" smtClean="0"/>
-              <a:t>11/16/2016</a:t>
+              <a:t>11/23/2016</a:t>
             </a:fld>
             <a:endParaRPr lang="en-US"/>
           </a:p>
@@ -4594,7 +4596,7 @@
           <a:p>
             <a:fld id="{792B2D57-2864-4E3D-B44A-69283E94E5CC}" type="datetimeFigureOut">
               <a:rPr lang="en-US" smtClean="0"/>
-              <a:t>11/16/2016</a:t>
+              <a:t>11/23/2016</a:t>
             </a:fld>
             <a:endParaRPr lang="en-US"/>
           </a:p>
@@ -7245,7 +7247,7 @@
           <a:p>
             <a:fld id="{792B2D57-2864-4E3D-B44A-69283E94E5CC}" type="datetimeFigureOut">
               <a:rPr lang="en-US" smtClean="0"/>
-              <a:t>11/16/2016</a:t>
+              <a:t>11/23/2016</a:t>
             </a:fld>
             <a:endParaRPr lang="en-US"/>
           </a:p>
@@ -10457,7 +10459,7 @@
           <a:p>
             <a:fld id="{792B2D57-2864-4E3D-B44A-69283E94E5CC}" type="datetimeFigureOut">
               <a:rPr lang="en-US" smtClean="0"/>
-              <a:t>11/16/2016</a:t>
+              <a:t>11/23/2016</a:t>
             </a:fld>
             <a:endParaRPr lang="en-US"/>
           </a:p>
@@ -13279,7 +13281,7 @@
           <a:p>
             <a:fld id="{792B2D57-2864-4E3D-B44A-69283E94E5CC}" type="datetimeFigureOut">
               <a:rPr lang="en-US" smtClean="0"/>
-              <a:t>11/16/2016</a:t>
+              <a:t>11/23/2016</a:t>
             </a:fld>
             <a:endParaRPr lang="en-US"/>
           </a:p>
@@ -13780,13 +13782,37 @@
         <p:spPr/>
         <p:txBody>
           <a:bodyPr>
-            <a:normAutofit/>
+            <a:normAutofit fontScale="92500" lnSpcReduction="20000"/>
           </a:bodyPr>
           <a:lstStyle/>
           <a:p>
             <a:r>
               <a:rPr lang="en-US" dirty="0" smtClean="0"/>
-              <a:t>Brief Overview</a:t>
+              <a:t>Unit testing</a:t>
+            </a:r>
+            <a:br>
+              <a:rPr lang="en-US" dirty="0" smtClean="0"/>
+            </a:br>
+            <a:r>
+              <a:rPr lang="en-US" dirty="0" smtClean="0"/>
+              <a:t/>
+            </a:r>
+            <a:br>
+              <a:rPr lang="en-US" dirty="0" smtClean="0"/>
+            </a:br>
+            <a:r>
+              <a:rPr lang="en-US" dirty="0" smtClean="0"/>
+              <a:t>Google Test Framework</a:t>
+            </a:r>
+            <a:br>
+              <a:rPr lang="en-US" dirty="0" smtClean="0"/>
+            </a:br>
+            <a:endParaRPr lang="en-US" dirty="0" smtClean="0"/>
+          </a:p>
+          <a:p>
+            <a:r>
+              <a:rPr lang="en-US" dirty="0" smtClean="0"/>
+              <a:t>Google Mock Framework</a:t>
             </a:r>
             <a:endParaRPr lang="en-US" dirty="0"/>
           </a:p>
@@ -13891,6 +13917,240 @@
       </p:grpSpPr>
       <p:sp>
         <p:nvSpPr>
+          <p:cNvPr id="4" name="Title 3"/>
+          <p:cNvSpPr>
+            <a:spLocks noGrp="1"/>
+          </p:cNvSpPr>
+          <p:nvPr>
+            <p:ph type="title"/>
+          </p:nvPr>
+        </p:nvSpPr>
+        <p:spPr/>
+        <p:txBody>
+          <a:bodyPr/>
+          <a:lstStyle/>
+          <a:p>
+            <a:r>
+              <a:rPr lang="en-US" dirty="0" smtClean="0"/>
+              <a:t>Building test application</a:t>
+            </a:r>
+            <a:endParaRPr lang="en-US" dirty="0"/>
+          </a:p>
+        </p:txBody>
+      </p:sp>
+      <p:sp>
+        <p:nvSpPr>
+          <p:cNvPr id="5" name="Text Placeholder 4"/>
+          <p:cNvSpPr>
+            <a:spLocks noGrp="1"/>
+          </p:cNvSpPr>
+          <p:nvPr>
+            <p:ph type="body" idx="1"/>
+          </p:nvPr>
+        </p:nvSpPr>
+        <p:spPr/>
+        <p:txBody>
+          <a:bodyPr/>
+          <a:lstStyle/>
+          <a:p>
+            <a:r>
+              <a:rPr lang="en-US" dirty="0" smtClean="0"/>
+              <a:t>GCC/</a:t>
+            </a:r>
+            <a:r>
+              <a:rPr lang="en-US" dirty="0" err="1" smtClean="0"/>
+              <a:t>MinGW</a:t>
+            </a:r>
+            <a:r>
+              <a:rPr lang="en-US" dirty="0" smtClean="0"/>
+              <a:t> building</a:t>
+            </a:r>
+            <a:endParaRPr lang="en-US" dirty="0"/>
+          </a:p>
+        </p:txBody>
+      </p:sp>
+    </p:spTree>
+    <p:extLst>
+      <p:ext uri="{BB962C8B-B14F-4D97-AF65-F5344CB8AC3E}">
+        <p14:creationId xmlns:p14="http://schemas.microsoft.com/office/powerpoint/2010/main" val="726889190"/>
+      </p:ext>
+    </p:extLst>
+  </p:cSld>
+  <p:clrMapOvr>
+    <a:masterClrMapping/>
+  </p:clrMapOvr>
+  <p:timing>
+    <p:tnLst>
+      <p:par>
+        <p:cTn id="1" dur="indefinite" restart="never" nodeType="tmRoot"/>
+      </p:par>
+    </p:tnLst>
+  </p:timing>
+</p:sld>
+</file>
+
+<file path=ppt/slides/slide11.xml><?xml version="1.0" encoding="utf-8"?>
+<p:sld xmlns:a="http://schemas.openxmlformats.org/drawingml/2006/main" xmlns:r="http://schemas.openxmlformats.org/officeDocument/2006/relationships" xmlns:p="http://schemas.openxmlformats.org/presentationml/2006/main">
+  <p:cSld>
+    <p:spTree>
+      <p:nvGrpSpPr>
+        <p:cNvPr id="1" name=""/>
+        <p:cNvGrpSpPr/>
+        <p:nvPr/>
+      </p:nvGrpSpPr>
+      <p:grpSpPr>
+        <a:xfrm>
+          <a:off x="0" y="0"/>
+          <a:ext cx="0" cy="0"/>
+          <a:chOff x="0" y="0"/>
+          <a:chExt cx="0" cy="0"/>
+        </a:xfrm>
+      </p:grpSpPr>
+      <p:sp>
+        <p:nvSpPr>
+          <p:cNvPr id="4" name="Title 3"/>
+          <p:cNvSpPr>
+            <a:spLocks noGrp="1"/>
+          </p:cNvSpPr>
+          <p:nvPr>
+            <p:ph type="title"/>
+          </p:nvPr>
+        </p:nvSpPr>
+        <p:spPr/>
+        <p:txBody>
+          <a:bodyPr/>
+          <a:lstStyle/>
+          <a:p>
+            <a:r>
+              <a:rPr lang="en-US" dirty="0" smtClean="0"/>
+              <a:t>Getting GTF/GMF sources</a:t>
+            </a:r>
+            <a:endParaRPr lang="en-US" dirty="0"/>
+          </a:p>
+        </p:txBody>
+      </p:sp>
+      <p:sp>
+        <p:nvSpPr>
+          <p:cNvPr id="5" name="Content Placeholder 4"/>
+          <p:cNvSpPr>
+            <a:spLocks noGrp="1"/>
+          </p:cNvSpPr>
+          <p:nvPr>
+            <p:ph idx="1"/>
+          </p:nvPr>
+        </p:nvSpPr>
+        <p:spPr/>
+        <p:txBody>
+          <a:bodyPr/>
+          <a:lstStyle/>
+          <a:p>
+            <a:r>
+              <a:rPr lang="en-US" dirty="0" smtClean="0"/>
+              <a:t>In order to obtain Google Test framework sources you will have to clone or download a GitHub repository on your machine.</a:t>
+            </a:r>
+            <a:br>
+              <a:rPr lang="en-US" dirty="0" smtClean="0"/>
+            </a:br>
+            <a:r>
+              <a:rPr lang="en-US" dirty="0" smtClean="0"/>
+              <a:t>For this you may use a </a:t>
+            </a:r>
+            <a:r>
+              <a:rPr lang="en-US" dirty="0"/>
+              <a:t>link below:</a:t>
+            </a:r>
+            <a:br>
+              <a:rPr lang="en-US" dirty="0"/>
+            </a:br>
+            <a:r>
+              <a:rPr lang="en-US" dirty="0"/>
+              <a:t/>
+            </a:r>
+            <a:br>
+              <a:rPr lang="en-US" dirty="0"/>
+            </a:br>
+            <a:r>
+              <a:rPr lang="en-US" dirty="0">
+                <a:solidFill>
+                  <a:schemeClr val="accent2">
+                    <a:lumMod val="75000"/>
+                  </a:schemeClr>
+                </a:solidFill>
+              </a:rPr>
+              <a:t>https://github.com/google/googletest</a:t>
+            </a:r>
+          </a:p>
+        </p:txBody>
+      </p:sp>
+      <p:pic>
+        <p:nvPicPr>
+          <p:cNvPr id="7" name="Picture 6"/>
+          <p:cNvPicPr>
+            <a:picLocks noChangeAspect="1"/>
+          </p:cNvPicPr>
+          <p:nvPr/>
+        </p:nvPicPr>
+        <p:blipFill>
+          <a:blip r:embed="rId2" cstate="print">
+            <a:extLst>
+              <a:ext uri="{28A0092B-C50C-407E-A947-70E740481C1C}">
+                <a14:useLocalDpi xmlns:a14="http://schemas.microsoft.com/office/drawing/2010/main" val="0"/>
+              </a:ext>
+            </a:extLst>
+          </a:blip>
+          <a:stretch>
+            <a:fillRect/>
+          </a:stretch>
+        </p:blipFill>
+        <p:spPr>
+          <a:xfrm>
+            <a:off x="4572000" y="-152402"/>
+            <a:ext cx="2438400" cy="903833"/>
+          </a:xfrm>
+          <a:prstGeom prst="rect">
+            <a:avLst/>
+          </a:prstGeom>
+        </p:spPr>
+      </p:pic>
+    </p:spTree>
+    <p:extLst>
+      <p:ext uri="{BB962C8B-B14F-4D97-AF65-F5344CB8AC3E}">
+        <p14:creationId xmlns:p14="http://schemas.microsoft.com/office/powerpoint/2010/main" val="3824966028"/>
+      </p:ext>
+    </p:extLst>
+  </p:cSld>
+  <p:clrMapOvr>
+    <a:masterClrMapping/>
+  </p:clrMapOvr>
+  <p:timing>
+    <p:tnLst>
+      <p:par>
+        <p:cTn id="1" dur="indefinite" restart="never" nodeType="tmRoot"/>
+      </p:par>
+    </p:tnLst>
+  </p:timing>
+</p:sld>
+</file>
+
+<file path=ppt/slides/slide12.xml><?xml version="1.0" encoding="utf-8"?>
+<p:sld xmlns:a="http://schemas.openxmlformats.org/drawingml/2006/main" xmlns:r="http://schemas.openxmlformats.org/officeDocument/2006/relationships" xmlns:p="http://schemas.openxmlformats.org/presentationml/2006/main">
+  <p:cSld>
+    <p:spTree>
+      <p:nvGrpSpPr>
+        <p:cNvPr id="1" name=""/>
+        <p:cNvGrpSpPr/>
+        <p:nvPr/>
+      </p:nvGrpSpPr>
+      <p:grpSpPr>
+        <a:xfrm>
+          <a:off x="0" y="0"/>
+          <a:ext cx="0" cy="0"/>
+          <a:chOff x="0" y="0"/>
+          <a:chExt cx="0" cy="0"/>
+        </a:xfrm>
+      </p:grpSpPr>
+      <p:sp>
+        <p:nvSpPr>
           <p:cNvPr id="2" name="Title 1"/>
           <p:cNvSpPr>
             <a:spLocks noGrp="1"/>
@@ -14198,13 +14458,37 @@
                   <a:schemeClr val="accent2"/>
                 </a:solidFill>
               </a:rPr>
-              <a:t>Nowadays unit testing is an essential part of an essential part of Software Development Process</a:t>
+              <a:t>Nowadays unit testing is an essential part </a:t>
+            </a:r>
+            <a:r>
+              <a:rPr lang="en-US" dirty="0" smtClean="0">
+                <a:solidFill>
+                  <a:schemeClr val="accent2"/>
+                </a:solidFill>
+              </a:rPr>
+              <a:t>of </a:t>
+            </a:r>
+            <a:r>
+              <a:rPr lang="en-US" dirty="0" smtClean="0">
+                <a:solidFill>
+                  <a:schemeClr val="accent2"/>
+                </a:solidFill>
+              </a:rPr>
+              <a:t>Software Development Process</a:t>
             </a:r>
           </a:p>
           <a:p>
             <a:r>
               <a:rPr lang="en-US" dirty="0" smtClean="0"/>
-              <a:t>Unit tests are being developed by software engineers</a:t>
+              <a:t>Unit tests are being developed </a:t>
+            </a:r>
+            <a:r>
+              <a:rPr lang="en-US" dirty="0" smtClean="0"/>
+              <a:t>and maintained by </a:t>
+            </a:r>
+            <a:r>
+              <a:rPr lang="en-US" dirty="0" smtClean="0"/>
+              <a:t>software engineers</a:t>
             </a:r>
             <a:endParaRPr lang="en-US" dirty="0"/>
           </a:p>
@@ -14311,7 +14595,23 @@
           <a:p>
             <a:r>
               <a:rPr lang="en-US" dirty="0" smtClean="0"/>
-              <a:t>Usually test frameworks provide much more complicated scenarios than argument-result checking</a:t>
+              <a:t>Usually test frameworks </a:t>
+            </a:r>
+            <a:r>
+              <a:rPr lang="en-US" dirty="0" smtClean="0"/>
+              <a:t>facilitate testing  of much </a:t>
+            </a:r>
+            <a:r>
+              <a:rPr lang="en-US" dirty="0" smtClean="0"/>
+              <a:t>more complicated scenarios than </a:t>
+            </a:r>
+            <a:r>
+              <a:rPr lang="en-US" dirty="0" smtClean="0"/>
+              <a:t>simple argument-result </a:t>
+            </a:r>
+            <a:r>
+              <a:rPr lang="en-US" dirty="0" smtClean="0"/>
+              <a:t>checking</a:t>
             </a:r>
           </a:p>
           <a:p>
@@ -14575,7 +14875,11 @@
           <a:bodyPr/>
           <a:lstStyle/>
           <a:p>
-            <a:endParaRPr lang="en-US"/>
+            <a:r>
+              <a:rPr lang="en-US" dirty="0" smtClean="0"/>
+              <a:t>Fundamentals</a:t>
+            </a:r>
+            <a:endParaRPr lang="en-US" dirty="0"/>
           </a:p>
         </p:txBody>
       </p:sp>
@@ -14594,7 +14898,51 @@
           <a:bodyPr/>
           <a:lstStyle/>
           <a:p>
-            <a:endParaRPr lang="en-US"/>
+            <a:r>
+              <a:rPr lang="en-US" dirty="0" smtClean="0"/>
+              <a:t>In essence Google Test Framework is represented by several fundamental parts:</a:t>
+            </a:r>
+          </a:p>
+          <a:p>
+            <a:pPr marL="525780" indent="-457200">
+              <a:buFont typeface="+mj-lt"/>
+              <a:buAutoNum type="arabicPeriod"/>
+            </a:pPr>
+            <a:r>
+              <a:rPr lang="en-US" dirty="0" smtClean="0"/>
+              <a:t>Assertions</a:t>
+            </a:r>
+          </a:p>
+          <a:p>
+            <a:pPr marL="525780" indent="-457200">
+              <a:buFont typeface="+mj-lt"/>
+              <a:buAutoNum type="arabicPeriod"/>
+            </a:pPr>
+            <a:r>
+              <a:rPr lang="en-US" dirty="0" smtClean="0"/>
+              <a:t>Tests</a:t>
+            </a:r>
+          </a:p>
+          <a:p>
+            <a:pPr marL="525780" indent="-457200">
+              <a:buFont typeface="+mj-lt"/>
+              <a:buAutoNum type="arabicPeriod"/>
+            </a:pPr>
+            <a:r>
+              <a:rPr lang="en-US" dirty="0" smtClean="0"/>
+              <a:t>Fixtures</a:t>
+            </a:r>
+          </a:p>
+          <a:p>
+            <a:pPr marL="525780" indent="-457200">
+              <a:buFont typeface="+mj-lt"/>
+              <a:buAutoNum type="arabicPeriod"/>
+            </a:pPr>
+            <a:r>
+              <a:rPr lang="en-US" dirty="0" smtClean="0"/>
+              <a:t>Test execution</a:t>
+            </a:r>
+            <a:endParaRPr lang="en-US" dirty="0"/>
           </a:p>
         </p:txBody>
       </p:sp>
@@ -14637,7 +14985,7 @@
       </p:grpSpPr>
       <p:sp>
         <p:nvSpPr>
-          <p:cNvPr id="4" name="Title 3"/>
+          <p:cNvPr id="2" name="Title 1"/>
           <p:cNvSpPr>
             <a:spLocks noGrp="1"/>
           </p:cNvSpPr>
@@ -14652,7 +15000,7 @@
           <a:p>
             <a:r>
               <a:rPr lang="en-US" dirty="0" smtClean="0"/>
-              <a:t>Building test application</a:t>
+              <a:t>Assertions</a:t>
             </a:r>
             <a:endParaRPr lang="en-US" dirty="0"/>
           </a:p>
@@ -14660,12 +15008,12 @@
       </p:sp>
       <p:sp>
         <p:nvSpPr>
-          <p:cNvPr id="5" name="Text Placeholder 4"/>
+          <p:cNvPr id="3" name="Content Placeholder 2"/>
           <p:cNvSpPr>
             <a:spLocks noGrp="1"/>
           </p:cNvSpPr>
           <p:nvPr>
-            <p:ph type="body" idx="1"/>
+            <p:ph idx="1"/>
           </p:nvPr>
         </p:nvSpPr>
         <p:spPr/>
@@ -14675,16 +15023,46 @@
           <a:p>
             <a:r>
               <a:rPr lang="en-US" dirty="0" smtClean="0"/>
-              <a:t>GCC/</a:t>
+              <a:t>Assertions in Google Test framework are macros used to check certain conditions</a:t>
             </a:r>
-            <a:r>
-              <a:rPr lang="en-US" dirty="0" err="1" smtClean="0"/>
-              <a:t>MinGW</a:t>
-            </a:r>
+          </a:p>
+          <a:p>
             <a:r>
               <a:rPr lang="en-US" dirty="0" smtClean="0"/>
-              <a:t> building</a:t>
+              <a:t>There are following types of assertion macros in GTF:</a:t>
             </a:r>
+          </a:p>
+          <a:p>
+            <a:pPr marL="525780" indent="-457200">
+              <a:buFont typeface="+mj-lt"/>
+              <a:buAutoNum type="arabicPeriod"/>
+            </a:pPr>
+            <a:r>
+              <a:rPr lang="en-US" dirty="0" smtClean="0"/>
+              <a:t>EXPECT_* macros</a:t>
+            </a:r>
+          </a:p>
+          <a:p>
+            <a:pPr marL="525780" indent="-457200">
+              <a:buFont typeface="+mj-lt"/>
+              <a:buAutoNum type="arabicPeriod"/>
+            </a:pPr>
+            <a:r>
+              <a:rPr lang="en-US" dirty="0" smtClean="0"/>
+              <a:t>ASSERT_* macros</a:t>
+            </a:r>
+          </a:p>
+          <a:p>
+            <a:pPr marL="525780" indent="-457200">
+              <a:buFont typeface="+mj-lt"/>
+              <a:buAutoNum type="arabicPeriod"/>
+            </a:pPr>
+            <a:r>
+              <a:rPr lang="en-US" dirty="0" smtClean="0"/>
+              <a:t>Death assertions</a:t>
+            </a:r>
+          </a:p>
+          <a:p>
             <a:endParaRPr lang="en-US" dirty="0"/>
           </a:p>
         </p:txBody>
@@ -14692,20 +15070,13 @@
     </p:spTree>
     <p:extLst>
       <p:ext uri="{BB962C8B-B14F-4D97-AF65-F5344CB8AC3E}">
-        <p14:creationId xmlns:p14="http://schemas.microsoft.com/office/powerpoint/2010/main" val="726889190"/>
+        <p14:creationId xmlns:p14="http://schemas.microsoft.com/office/powerpoint/2010/main" val="4229327596"/>
       </p:ext>
     </p:extLst>
   </p:cSld>
   <p:clrMapOvr>
     <a:masterClrMapping/>
   </p:clrMapOvr>
-  <p:timing>
-    <p:tnLst>
-      <p:par>
-        <p:cTn id="1" dur="indefinite" restart="never" nodeType="tmRoot"/>
-      </p:par>
-    </p:tnLst>
-  </p:timing>
 </p:sld>
 </file>
 
@@ -14728,7 +15099,7 @@
       </p:grpSpPr>
       <p:sp>
         <p:nvSpPr>
-          <p:cNvPr id="4" name="Title 3"/>
+          <p:cNvPr id="2" name="Title 1"/>
           <p:cNvSpPr>
             <a:spLocks noGrp="1"/>
           </p:cNvSpPr>
@@ -14743,7 +15114,7 @@
           <a:p>
             <a:r>
               <a:rPr lang="en-US" dirty="0" smtClean="0"/>
-              <a:t>Getting GTF/GMF sources</a:t>
+              <a:t>Tests</a:t>
             </a:r>
             <a:endParaRPr lang="en-US" dirty="0"/>
           </a:p>
@@ -14751,7 +15122,7 @@
       </p:sp>
       <p:sp>
         <p:nvSpPr>
-          <p:cNvPr id="5" name="Content Placeholder 4"/>
+          <p:cNvPr id="3" name="Content Placeholder 2"/>
           <p:cNvSpPr>
             <a:spLocks noGrp="1"/>
           </p:cNvSpPr>
@@ -14766,89 +15137,54 @@
           <a:p>
             <a:r>
               <a:rPr lang="en-US" dirty="0" smtClean="0"/>
-              <a:t>In order to obtain Google Test framework sources you will have to clone or download a GitHub repository on your machine.</a:t>
+              <a:t>Tests are basically a set of assertions executed as a single unit</a:t>
             </a:r>
-            <a:br>
-              <a:rPr lang="en-US" dirty="0" smtClean="0"/>
-            </a:br>
+          </a:p>
+          <a:p>
             <a:r>
               <a:rPr lang="en-US" dirty="0" smtClean="0"/>
-              <a:t>For this you may use a </a:t>
+              <a:t>Tests are mostly used to structure your testing project and testing report</a:t>
             </a:r>
+          </a:p>
+          <a:p>
             <a:r>
-              <a:rPr lang="en-US" dirty="0"/>
-              <a:t>link below:</a:t>
+              <a:rPr lang="en-US" dirty="0" smtClean="0"/>
+              <a:t>Structuring is done using following two macros:</a:t>
             </a:r>
-            <a:br>
-              <a:rPr lang="en-US" dirty="0"/>
-            </a:br>
+          </a:p>
+          <a:p>
+            <a:pPr marL="525780" indent="-457200">
+              <a:buFont typeface="+mj-lt"/>
+              <a:buAutoNum type="arabicPeriod"/>
+            </a:pPr>
             <a:r>
-              <a:rPr lang="en-US" dirty="0"/>
-              <a:t/>
+              <a:rPr lang="en-US" dirty="0" smtClean="0"/>
+              <a:t>TEST macro</a:t>
             </a:r>
-            <a:br>
-              <a:rPr lang="en-US" dirty="0"/>
-            </a:br>
+          </a:p>
+          <a:p>
+            <a:pPr marL="525780" indent="-457200">
+              <a:buFont typeface="+mj-lt"/>
+              <a:buAutoNum type="arabicPeriod"/>
+            </a:pPr>
             <a:r>
-              <a:rPr lang="en-US" dirty="0">
-                <a:solidFill>
-                  <a:schemeClr val="accent2">
-                    <a:lumMod val="75000"/>
-                  </a:schemeClr>
-                </a:solidFill>
-              </a:rPr>
-              <a:t>https://github.com/google/googletest</a:t>
+              <a:rPr lang="en-US" dirty="0" smtClean="0"/>
+              <a:t>TEST_F macro</a:t>
             </a:r>
+            <a:endParaRPr lang="en-US" dirty="0"/>
           </a:p>
         </p:txBody>
       </p:sp>
-      <p:pic>
-        <p:nvPicPr>
-          <p:cNvPr id="7" name="Picture 6"/>
-          <p:cNvPicPr>
-            <a:picLocks noChangeAspect="1"/>
-          </p:cNvPicPr>
-          <p:nvPr/>
-        </p:nvPicPr>
-        <p:blipFill>
-          <a:blip r:embed="rId2" cstate="print">
-            <a:extLst>
-              <a:ext uri="{28A0092B-C50C-407E-A947-70E740481C1C}">
-                <a14:useLocalDpi xmlns:a14="http://schemas.microsoft.com/office/drawing/2010/main" val="0"/>
-              </a:ext>
-            </a:extLst>
-          </a:blip>
-          <a:stretch>
-            <a:fillRect/>
-          </a:stretch>
-        </p:blipFill>
-        <p:spPr>
-          <a:xfrm>
-            <a:off x="4572000" y="-152402"/>
-            <a:ext cx="2438400" cy="903833"/>
-          </a:xfrm>
-          <a:prstGeom prst="rect">
-            <a:avLst/>
-          </a:prstGeom>
-        </p:spPr>
-      </p:pic>
     </p:spTree>
     <p:extLst>
       <p:ext uri="{BB962C8B-B14F-4D97-AF65-F5344CB8AC3E}">
-        <p14:creationId xmlns:p14="http://schemas.microsoft.com/office/powerpoint/2010/main" val="3824966028"/>
+        <p14:creationId xmlns:p14="http://schemas.microsoft.com/office/powerpoint/2010/main" val="621664853"/>
       </p:ext>
     </p:extLst>
   </p:cSld>
   <p:clrMapOvr>
     <a:masterClrMapping/>
   </p:clrMapOvr>
-  <p:timing>
-    <p:tnLst>
-      <p:par>
-        <p:cTn id="1" dur="indefinite" restart="never" nodeType="tmRoot"/>
-      </p:par>
-    </p:tnLst>
-  </p:timing>
 </p:sld>
 </file>
 

</xml_diff>